<commit_message>
Signed-off-by: Azure Blue <974762673@qq.com>
</commit_message>
<xml_diff>
--- a/Knowledge Graph For Recommendation/VRKG4Rec/VRKG4Rec.pptx
+++ b/Knowledge Graph For Recommendation/VRKG4Rec/VRKG4Rec.pptx
@@ -60,6 +60,11 @@
     <p:embeddedFont>
       <p:font typeface="Cambria Math" panose="02040503050406030204" pitchFamily="18" charset="0"/>
       <p:regular r:id="rId39"/>
+    </p:embeddedFont>
+    <p:embeddedFont>
+      <p:font typeface="微软雅黑" panose="020B0503020204020204" pitchFamily="34" charset="-122"/>
+      <p:regular r:id="rId40"/>
+      <p:bold r:id="rId41"/>
     </p:embeddedFont>
     <p:embeddedFont>
       <p:font typeface="微软雅黑" panose="020B0503020204020204" pitchFamily="34" charset="-122"/>
@@ -263,7 +268,7 @@
           <a:p>
             <a:fld id="{E9322016-10F6-433F-8A73-AEE06F02DA3F}" type="datetimeFigureOut">
               <a:rPr lang="zh-CN" altLang="en-US" smtClean="0"/>
-              <a:t>2023/4/25</a:t>
+              <a:t>2023/4/27</a:t>
             </a:fld>
             <a:endParaRPr lang="zh-CN" altLang="en-US"/>
           </a:p>
@@ -841,7 +846,7 @@
           <a:p>
             <a:fld id="{D997B5FA-0921-464F-AAE1-844C04324D75}" type="datetimeFigureOut">
               <a:rPr lang="zh-CN" altLang="en-US" smtClean="0"/>
-              <a:t>2023/4/25</a:t>
+              <a:t>2023/4/27</a:t>
             </a:fld>
             <a:endParaRPr lang="zh-CN" altLang="en-US"/>
           </a:p>
@@ -1012,7 +1017,7 @@
           <a:p>
             <a:fld id="{D997B5FA-0921-464F-AAE1-844C04324D75}" type="datetimeFigureOut">
               <a:rPr lang="zh-CN" altLang="en-US" smtClean="0"/>
-              <a:t>2023/4/25</a:t>
+              <a:t>2023/4/27</a:t>
             </a:fld>
             <a:endParaRPr lang="zh-CN" altLang="en-US"/>
           </a:p>
@@ -1193,7 +1198,7 @@
           <a:p>
             <a:fld id="{D997B5FA-0921-464F-AAE1-844C04324D75}" type="datetimeFigureOut">
               <a:rPr lang="zh-CN" altLang="en-US" smtClean="0"/>
-              <a:t>2023/4/25</a:t>
+              <a:t>2023/4/27</a:t>
             </a:fld>
             <a:endParaRPr lang="zh-CN" altLang="en-US"/>
           </a:p>
@@ -1393,7 +1398,7 @@
                 </a:solidFill>
               </a:rPr>
               <a:pPr/>
-              <a:t>2023/4/25</a:t>
+              <a:t>2023/4/27</a:t>
             </a:fld>
             <a:endParaRPr lang="zh-CN" altLang="en-US">
               <a:solidFill>
@@ -1596,7 +1601,7 @@
                 </a:solidFill>
               </a:rPr>
               <a:pPr/>
-              <a:t>2023/4/25</a:t>
+              <a:t>2023/4/27</a:t>
             </a:fld>
             <a:endParaRPr lang="zh-CN" altLang="en-US">
               <a:solidFill>
@@ -1792,7 +1797,7 @@
           <a:p>
             <a:fld id="{D997B5FA-0921-464F-AAE1-844C04324D75}" type="datetimeFigureOut">
               <a:rPr lang="zh-CN" altLang="en-US" smtClean="0"/>
-              <a:t>2023/4/25</a:t>
+              <a:t>2023/4/27</a:t>
             </a:fld>
             <a:endParaRPr lang="zh-CN" altLang="en-US"/>
           </a:p>
@@ -2040,7 +2045,7 @@
           <a:p>
             <a:fld id="{D997B5FA-0921-464F-AAE1-844C04324D75}" type="datetimeFigureOut">
               <a:rPr lang="zh-CN" altLang="en-US" smtClean="0"/>
-              <a:t>2023/4/25</a:t>
+              <a:t>2023/4/27</a:t>
             </a:fld>
             <a:endParaRPr lang="zh-CN" altLang="en-US"/>
           </a:p>
@@ -2272,7 +2277,7 @@
           <a:p>
             <a:fld id="{D997B5FA-0921-464F-AAE1-844C04324D75}" type="datetimeFigureOut">
               <a:rPr lang="zh-CN" altLang="en-US" smtClean="0"/>
-              <a:t>2023/4/25</a:t>
+              <a:t>2023/4/27</a:t>
             </a:fld>
             <a:endParaRPr lang="zh-CN" altLang="en-US"/>
           </a:p>
@@ -2639,7 +2644,7 @@
           <a:p>
             <a:fld id="{D997B5FA-0921-464F-AAE1-844C04324D75}" type="datetimeFigureOut">
               <a:rPr lang="zh-CN" altLang="en-US" smtClean="0"/>
-              <a:t>2023/4/25</a:t>
+              <a:t>2023/4/27</a:t>
             </a:fld>
             <a:endParaRPr lang="zh-CN" altLang="en-US"/>
           </a:p>
@@ -2759,7 +2764,7 @@
           <a:p>
             <a:fld id="{D997B5FA-0921-464F-AAE1-844C04324D75}" type="datetimeFigureOut">
               <a:rPr lang="zh-CN" altLang="en-US" smtClean="0"/>
-              <a:t>2023/4/25</a:t>
+              <a:t>2023/4/27</a:t>
             </a:fld>
             <a:endParaRPr lang="zh-CN" altLang="en-US"/>
           </a:p>
@@ -2857,7 +2862,7 @@
           <a:p>
             <a:fld id="{D997B5FA-0921-464F-AAE1-844C04324D75}" type="datetimeFigureOut">
               <a:rPr lang="zh-CN" altLang="en-US" smtClean="0"/>
-              <a:t>2023/4/25</a:t>
+              <a:t>2023/4/27</a:t>
             </a:fld>
             <a:endParaRPr lang="zh-CN" altLang="en-US"/>
           </a:p>
@@ -3135,7 +3140,7 @@
           <a:p>
             <a:fld id="{D997B5FA-0921-464F-AAE1-844C04324D75}" type="datetimeFigureOut">
               <a:rPr lang="zh-CN" altLang="en-US" smtClean="0"/>
-              <a:t>2023/4/25</a:t>
+              <a:t>2023/4/27</a:t>
             </a:fld>
             <a:endParaRPr lang="zh-CN" altLang="en-US"/>
           </a:p>
@@ -3390,7 +3395,7 @@
           <a:p>
             <a:fld id="{D997B5FA-0921-464F-AAE1-844C04324D75}" type="datetimeFigureOut">
               <a:rPr lang="zh-CN" altLang="en-US" smtClean="0"/>
-              <a:t>2023/4/25</a:t>
+              <a:t>2023/4/27</a:t>
             </a:fld>
             <a:endParaRPr lang="zh-CN" altLang="en-US"/>
           </a:p>
@@ -3604,7 +3609,7 @@
           <a:p>
             <a:fld id="{D997B5FA-0921-464F-AAE1-844C04324D75}" type="datetimeFigureOut">
               <a:rPr lang="zh-CN" altLang="en-US" smtClean="0"/>
-              <a:t>2023/4/25</a:t>
+              <a:t>2023/4/27</a:t>
             </a:fld>
             <a:endParaRPr lang="zh-CN" altLang="en-US"/>
           </a:p>
@@ -4162,7 +4167,7 @@
                 </a:solidFill>
               </a:rPr>
               <a:pPr/>
-              <a:t>2023/4/25</a:t>
+              <a:t>2023/4/27</a:t>
             </a:fld>
             <a:endParaRPr lang="zh-CN" altLang="en-US" dirty="0">
               <a:solidFill>
@@ -8067,8 +8072,8 @@
           </a:p>
         </p:txBody>
       </p:sp>
-      <mc:AlternateContent xmlns:mc="http://schemas.openxmlformats.org/markup-compatibility/2006" xmlns:a14="http://schemas.microsoft.com/office/drawing/2010/main">
-        <mc:Choice Requires="a14">
+      <mc:AlternateContent xmlns:mc="http://schemas.openxmlformats.org/markup-compatibility/2006">
+        <mc:Choice xmlns:a14="http://schemas.microsoft.com/office/drawing/2010/main" Requires="a14">
           <p:sp>
             <p:nvSpPr>
               <p:cNvPr id="4" name="文本框 3">
@@ -8084,7 +8089,7 @@
             <p:spPr>
               <a:xfrm>
                 <a:off x="4105342" y="2045073"/>
-                <a:ext cx="4313444" cy="4271682"/>
+                <a:ext cx="4313444" cy="5102679"/>
               </a:xfrm>
               <a:prstGeom prst="rect">
                 <a:avLst/>
@@ -8440,7 +8445,79 @@
                   <a:rPr lang="zh-CN" altLang="en-US" dirty="0">
                     <a:latin typeface="Abadi" panose="020B0604020104020204" pitchFamily="34" charset="0"/>
                   </a:rPr>
-                  <a:t>两步操作，直到符合某个中止条件</a:t>
+                  <a:t>两步操作，直到符合某个中止条件（</a:t>
+                </a:r>
+                <a:r>
+                  <a:rPr lang="en-US" altLang="zh-CN" b="0" i="0" dirty="0">
+                    <a:solidFill>
+                      <a:srgbClr val="111111"/>
+                    </a:solidFill>
+                    <a:effectLst/>
+                    <a:latin typeface="Microsoft YaHei" panose="020B0503020204020204" pitchFamily="34" charset="-122"/>
+                    <a:ea typeface="Microsoft YaHei" panose="020B0503020204020204" pitchFamily="34" charset="-122"/>
+                  </a:rPr>
+                  <a:t>1</a:t>
+                </a:r>
+                <a:r>
+                  <a:rPr lang="zh-CN" altLang="en-US" b="0" i="0" dirty="0">
+                    <a:solidFill>
+                      <a:srgbClr val="111111"/>
+                    </a:solidFill>
+                    <a:effectLst/>
+                    <a:latin typeface="Microsoft YaHei" panose="020B0503020204020204" pitchFamily="34" charset="-122"/>
+                    <a:ea typeface="Microsoft YaHei" panose="020B0503020204020204" pitchFamily="34" charset="-122"/>
+                  </a:rPr>
+                  <a:t>、没有（或最小数目）对象被重新分配给不同的聚类。 </a:t>
+                </a:r>
+                <a:r>
+                  <a:rPr lang="en-US" altLang="zh-CN" b="0" i="0" dirty="0">
+                    <a:solidFill>
+                      <a:srgbClr val="111111"/>
+                    </a:solidFill>
+                    <a:effectLst/>
+                    <a:latin typeface="Microsoft YaHei" panose="020B0503020204020204" pitchFamily="34" charset="-122"/>
+                    <a:ea typeface="Microsoft YaHei" panose="020B0503020204020204" pitchFamily="34" charset="-122"/>
+                  </a:rPr>
+                  <a:t>2</a:t>
+                </a:r>
+                <a:r>
+                  <a:rPr lang="zh-CN" altLang="en-US" b="0" i="0" dirty="0">
+                    <a:solidFill>
+                      <a:srgbClr val="111111"/>
+                    </a:solidFill>
+                    <a:effectLst/>
+                    <a:latin typeface="Microsoft YaHei" panose="020B0503020204020204" pitchFamily="34" charset="-122"/>
+                    <a:ea typeface="Microsoft YaHei" panose="020B0503020204020204" pitchFamily="34" charset="-122"/>
+                  </a:rPr>
+                  <a:t>、没有（或最小数目）聚类中心再发生变化。 </a:t>
+                </a:r>
+                <a:r>
+                  <a:rPr lang="en-US" altLang="zh-CN" b="0" i="0" dirty="0">
+                    <a:solidFill>
+                      <a:srgbClr val="111111"/>
+                    </a:solidFill>
+                    <a:effectLst/>
+                    <a:latin typeface="Microsoft YaHei" panose="020B0503020204020204" pitchFamily="34" charset="-122"/>
+                    <a:ea typeface="Microsoft YaHei" panose="020B0503020204020204" pitchFamily="34" charset="-122"/>
+                  </a:rPr>
+                  <a:t>3</a:t>
+                </a:r>
+                <a:r>
+                  <a:rPr lang="zh-CN" altLang="en-US" b="0" i="0" dirty="0">
+                    <a:solidFill>
+                      <a:srgbClr val="111111"/>
+                    </a:solidFill>
+                    <a:effectLst/>
+                    <a:latin typeface="Microsoft YaHei" panose="020B0503020204020204" pitchFamily="34" charset="-122"/>
+                    <a:ea typeface="Microsoft YaHei" panose="020B0503020204020204" pitchFamily="34" charset="-122"/>
+                  </a:rPr>
+                  <a:t>、误差平方和局部最小。</a:t>
+                </a:r>
+                <a:r>
+                  <a:rPr lang="zh-CN" altLang="en-US" dirty="0">
+                    <a:latin typeface="Abadi" panose="020B0604020104020204" pitchFamily="34" charset="0"/>
+                  </a:rPr>
+                  <a:t>）</a:t>
                 </a:r>
                 <a:endParaRPr lang="en-US" altLang="zh-CN" b="0" i="0" dirty="0">
                   <a:effectLst/>
@@ -8477,7 +8554,7 @@
             </p:txBody>
           </p:sp>
         </mc:Choice>
-        <mc:Fallback xmlns="">
+        <mc:Fallback>
           <p:sp>
             <p:nvSpPr>
               <p:cNvPr id="4" name="文本框 3">
@@ -8495,7 +8572,7 @@
             <p:spPr>
               <a:xfrm>
                 <a:off x="4105342" y="2045073"/>
-                <a:ext cx="4313444" cy="4271682"/>
+                <a:ext cx="4313444" cy="5102679"/>
               </a:xfrm>
               <a:prstGeom prst="rect">
                 <a:avLst/>
@@ -8503,7 +8580,7 @@
               <a:blipFill>
                 <a:blip r:embed="rId2"/>
                 <a:stretch>
-                  <a:fillRect l="-989" t="-856" r="-1130"/>
+                  <a:fillRect l="-989" t="-716" r="-1130"/>
                 </a:stretch>
               </a:blipFill>
             </p:spPr>
@@ -12273,8 +12350,8 @@
           </a:p>
         </p:txBody>
       </p:sp>
-      <mc:AlternateContent xmlns:mc="http://schemas.openxmlformats.org/markup-compatibility/2006">
-        <mc:Choice xmlns:a14="http://schemas.microsoft.com/office/drawing/2010/main" Requires="a14">
+      <mc:AlternateContent xmlns:mc="http://schemas.openxmlformats.org/markup-compatibility/2006" xmlns:a14="http://schemas.microsoft.com/office/drawing/2010/main">
+        <mc:Choice Requires="a14">
           <p:sp>
             <p:nvSpPr>
               <p:cNvPr id="11" name="文本框 10">
@@ -12475,7 +12552,7 @@
             </p:txBody>
           </p:sp>
         </mc:Choice>
-        <mc:Fallback>
+        <mc:Fallback xmlns="">
           <p:sp>
             <p:nvSpPr>
               <p:cNvPr id="11" name="文本框 10">
@@ -12580,8 +12657,8 @@
           </a:prstGeom>
         </p:spPr>
       </p:pic>
-      <mc:AlternateContent xmlns:mc="http://schemas.openxmlformats.org/markup-compatibility/2006">
-        <mc:Choice xmlns:a14="http://schemas.microsoft.com/office/drawing/2010/main" Requires="a14">
+      <mc:AlternateContent xmlns:mc="http://schemas.openxmlformats.org/markup-compatibility/2006" xmlns:a14="http://schemas.microsoft.com/office/drawing/2010/main">
+        <mc:Choice Requires="a14">
           <p:sp>
             <p:nvSpPr>
               <p:cNvPr id="18" name="文本框 17">
@@ -12696,7 +12773,7 @@
             </p:txBody>
           </p:sp>
         </mc:Choice>
-        <mc:Fallback>
+        <mc:Fallback xmlns="">
           <p:sp>
             <p:nvSpPr>
               <p:cNvPr id="18" name="文本框 17">
@@ -13401,8 +13478,8 @@
           </a:p>
         </p:txBody>
       </p:sp>
-      <mc:AlternateContent xmlns:mc="http://schemas.openxmlformats.org/markup-compatibility/2006">
-        <mc:Choice xmlns:a14="http://schemas.microsoft.com/office/drawing/2010/main" Requires="a14">
+      <mc:AlternateContent xmlns:mc="http://schemas.openxmlformats.org/markup-compatibility/2006" xmlns:a14="http://schemas.microsoft.com/office/drawing/2010/main">
+        <mc:Choice Requires="a14">
           <p:sp>
             <p:nvSpPr>
               <p:cNvPr id="11" name="文本框 10">
@@ -13697,7 +13774,7 @@
             </p:txBody>
           </p:sp>
         </mc:Choice>
-        <mc:Fallback>
+        <mc:Fallback xmlns="">
           <p:sp>
             <p:nvSpPr>
               <p:cNvPr id="11" name="文本框 10">
@@ -14474,8 +14551,8 @@
           </a:p>
         </p:txBody>
       </p:sp>
-      <mc:AlternateContent xmlns:mc="http://schemas.openxmlformats.org/markup-compatibility/2006">
-        <mc:Choice xmlns:a14="http://schemas.microsoft.com/office/drawing/2010/main" Requires="a14">
+      <mc:AlternateContent xmlns:mc="http://schemas.openxmlformats.org/markup-compatibility/2006" xmlns:a14="http://schemas.microsoft.com/office/drawing/2010/main">
+        <mc:Choice Requires="a14">
           <p:sp>
             <p:nvSpPr>
               <p:cNvPr id="11" name="文本框 10">
@@ -14708,7 +14785,7 @@
             </p:txBody>
           </p:sp>
         </mc:Choice>
-        <mc:Fallback>
+        <mc:Fallback xmlns="">
           <p:sp>
             <p:nvSpPr>
               <p:cNvPr id="11" name="文本框 10">
@@ -15546,8 +15623,8 @@
           </a:prstGeom>
         </p:spPr>
       </p:pic>
-      <mc:AlternateContent xmlns:mc="http://schemas.openxmlformats.org/markup-compatibility/2006">
-        <mc:Choice xmlns:a14="http://schemas.microsoft.com/office/drawing/2010/main" Requires="a14">
+      <mc:AlternateContent xmlns:mc="http://schemas.openxmlformats.org/markup-compatibility/2006" xmlns:a14="http://schemas.microsoft.com/office/drawing/2010/main">
+        <mc:Choice Requires="a14">
           <p:sp>
             <p:nvSpPr>
               <p:cNvPr id="17" name="文本框 16">
@@ -15774,7 +15851,7 @@
             </p:txBody>
           </p:sp>
         </mc:Choice>
-        <mc:Fallback>
+        <mc:Fallback xmlns="">
           <p:sp>
             <p:nvSpPr>
               <p:cNvPr id="17" name="文本框 16">
@@ -16536,7 +16613,7 @@
         </p:nvSpPr>
         <p:spPr>
           <a:xfrm>
-            <a:off x="1335337" y="4168838"/>
+            <a:off x="1921814" y="4091782"/>
             <a:ext cx="6629402" cy="369332"/>
           </a:xfrm>
           <a:prstGeom prst="rect">
@@ -16611,6 +16688,36 @@
           <a:xfrm>
             <a:off x="2007009" y="4715480"/>
             <a:ext cx="5129981" cy="712497"/>
+          </a:xfrm>
+          <a:prstGeom prst="rect">
+            <a:avLst/>
+          </a:prstGeom>
+        </p:spPr>
+      </p:pic>
+      <p:pic>
+        <p:nvPicPr>
+          <p:cNvPr id="5" name="图片 4">
+            <a:extLst>
+              <a:ext uri="{FF2B5EF4-FFF2-40B4-BE49-F238E27FC236}">
+                <a16:creationId xmlns:a16="http://schemas.microsoft.com/office/drawing/2014/main" id="{299622A3-D7EB-88FC-AF0B-83995C84856C}"/>
+              </a:ext>
+            </a:extLst>
+          </p:cNvPr>
+          <p:cNvPicPr>
+            <a:picLocks noChangeAspect="1"/>
+          </p:cNvPicPr>
+          <p:nvPr/>
+        </p:nvPicPr>
+        <p:blipFill>
+          <a:blip r:embed="rId4"/>
+          <a:stretch>
+            <a:fillRect/>
+          </a:stretch>
+        </p:blipFill>
+        <p:spPr>
+          <a:xfrm>
+            <a:off x="657608" y="2524486"/>
+            <a:ext cx="1165562" cy="2040833"/>
           </a:xfrm>
           <a:prstGeom prst="rect">
             <a:avLst/>
@@ -18894,8 +19001,8 @@
           </a:prstGeom>
         </p:spPr>
       </p:pic>
-      <mc:AlternateContent xmlns:mc="http://schemas.openxmlformats.org/markup-compatibility/2006">
-        <mc:Choice xmlns:a14="http://schemas.microsoft.com/office/drawing/2010/main" Requires="a14">
+      <mc:AlternateContent xmlns:mc="http://schemas.openxmlformats.org/markup-compatibility/2006" xmlns:a14="http://schemas.microsoft.com/office/drawing/2010/main">
+        <mc:Choice Requires="a14">
           <p:sp>
             <p:nvSpPr>
               <p:cNvPr id="16" name="文本框 15">
@@ -19098,7 +19205,7 @@
             </p:txBody>
           </p:sp>
         </mc:Choice>
-        <mc:Fallback>
+        <mc:Fallback xmlns="">
           <p:sp>
             <p:nvSpPr>
               <p:cNvPr id="16" name="文本框 15">
@@ -23099,7 +23206,7 @@
                 <a:latin typeface="微软雅黑" panose="020B0503020204020204" pitchFamily="34" charset="-122"/>
                 <a:ea typeface="微软雅黑" panose="020B0503020204020204" pitchFamily="34" charset="-122"/>
               </a:rPr>
-              <a:t>Variant2 </a:t>
+              <a:t>Variant-2 </a:t>
             </a:r>
             <a:r>
               <a:rPr lang="zh-CN" altLang="en-US" b="0" i="0" dirty="0">
@@ -25346,7 +25453,7 @@
         </p:nvSpPr>
         <p:spPr bwMode="auto">
           <a:xfrm>
-            <a:off x="1420603" y="2741725"/>
+            <a:off x="1420603" y="2741724"/>
             <a:ext cx="6127476" cy="1754326"/>
           </a:xfrm>
           <a:prstGeom prst="rect">
@@ -25397,18 +25504,17 @@
           <a:p>
             <a:pPr algn="just"/>
             <a:r>
-              <a:rPr lang="zh-CN" altLang="en-US" b="0" i="0" dirty="0">
+              <a:rPr lang="en-US" altLang="zh-CN" dirty="0">
                 <a:solidFill>
                   <a:srgbClr val="000000"/>
                 </a:solidFill>
-                <a:effectLst/>
                 <a:latin typeface="微软雅黑" panose="020B0503020204020204" pitchFamily="34" charset="-122"/>
                 <a:ea typeface="微软雅黑" panose="020B0503020204020204" pitchFamily="34" charset="-122"/>
               </a:rPr>
-              <a:t>在本文中，设计了三个模块，可以轻松应用于基于 </a:t>
-            </a:r>
-            <a:r>
-              <a:rPr lang="en-US" altLang="zh-CN" b="0" i="0" dirty="0">
+              <a:t>       </a:t>
+            </a:r>
+            <a:r>
+              <a:rPr lang="zh-CN" altLang="en-US" b="0" i="0" dirty="0">
                 <a:solidFill>
                   <a:srgbClr val="000000"/>
                 </a:solidFill>
@@ -25416,10 +25522,10 @@
                 <a:latin typeface="微软雅黑" panose="020B0503020204020204" pitchFamily="34" charset="-122"/>
                 <a:ea typeface="微软雅黑" panose="020B0503020204020204" pitchFamily="34" charset="-122"/>
               </a:rPr>
-              <a:t>GNN </a:t>
-            </a:r>
-            <a:r>
-              <a:rPr lang="zh-CN" altLang="en-US" b="0" i="0" dirty="0">
+              <a:t>尽管知识图谱有助于丰富项目和用户表示，但文中认为在不考虑特定下游任务的情况下直接利用原始 </a:t>
+            </a:r>
+            <a:r>
+              <a:rPr lang="en-US" altLang="zh-CN" b="0" i="0" dirty="0">
                 <a:solidFill>
                   <a:srgbClr val="000000"/>
                 </a:solidFill>
@@ -25427,10 +25533,10 @@
                 <a:latin typeface="微软雅黑" panose="020B0503020204020204" pitchFamily="34" charset="-122"/>
                 <a:ea typeface="微软雅黑" panose="020B0503020204020204" pitchFamily="34" charset="-122"/>
               </a:rPr>
-              <a:t>的推荐系统，以最小的准确性成本实现多样化。基于这三个模块，提出了 </a:t>
-            </a:r>
-            <a:r>
-              <a:rPr lang="en-US" altLang="zh-CN" b="0" i="0" dirty="0">
+              <a:t>KG </a:t>
+            </a:r>
+            <a:r>
+              <a:rPr lang="zh-CN" altLang="en-US" b="0" i="0" dirty="0">
                 <a:solidFill>
                   <a:srgbClr val="000000"/>
                 </a:solidFill>
@@ -25438,10 +25544,10 @@
                 <a:latin typeface="微软雅黑" panose="020B0503020204020204" pitchFamily="34" charset="-122"/>
                 <a:ea typeface="微软雅黑" panose="020B0503020204020204" pitchFamily="34" charset="-122"/>
               </a:rPr>
-              <a:t>DGRec</a:t>
-            </a:r>
-            <a:r>
-              <a:rPr lang="zh-CN" altLang="en-US" b="0" i="0" dirty="0">
+              <a:t>的所有关系是不明智的。在这项工作中，作者提出了一个 </a:t>
+            </a:r>
+            <a:r>
+              <a:rPr lang="en-US" altLang="zh-CN" b="0" i="0" dirty="0">
                 <a:solidFill>
                   <a:srgbClr val="000000"/>
                 </a:solidFill>
@@ -25449,10 +25555,10 @@
                 <a:latin typeface="微软雅黑" panose="020B0503020204020204" pitchFamily="34" charset="-122"/>
                 <a:ea typeface="微软雅黑" panose="020B0503020204020204" pitchFamily="34" charset="-122"/>
               </a:rPr>
-              <a:t>。在考虑多样性时，它超越了最先进的多样化推荐系统。它还实现了与最先进的基于准确性的推荐系统相当的准确性。 </a:t>
-            </a:r>
-            <a:r>
-              <a:rPr lang="en-US" altLang="zh-CN" b="0" i="0" dirty="0">
+              <a:t>VRKG4Rec </a:t>
+            </a:r>
+            <a:r>
+              <a:rPr lang="zh-CN" altLang="en-US" b="0" i="0" dirty="0">
                 <a:solidFill>
                   <a:srgbClr val="000000"/>
                 </a:solidFill>
@@ -25460,10 +25566,10 @@
                 <a:latin typeface="微软雅黑" panose="020B0503020204020204" pitchFamily="34" charset="-122"/>
                 <a:ea typeface="微软雅黑" panose="020B0503020204020204" pitchFamily="34" charset="-122"/>
               </a:rPr>
-              <a:t>DGRec </a:t>
-            </a:r>
-            <a:r>
-              <a:rPr lang="zh-CN" altLang="en-US" b="0" i="0" dirty="0">
+              <a:t>模型来首先构建 </a:t>
+            </a:r>
+            <a:r>
+              <a:rPr lang="en-US" altLang="zh-CN" b="0" i="0" dirty="0">
                 <a:solidFill>
                   <a:srgbClr val="000000"/>
                 </a:solidFill>
@@ -25471,7 +25577,40 @@
                 <a:latin typeface="微软雅黑" panose="020B0503020204020204" pitchFamily="34" charset="-122"/>
                 <a:ea typeface="微软雅黑" panose="020B0503020204020204" pitchFamily="34" charset="-122"/>
               </a:rPr>
-              <a:t>通过几个超参数实现准确性和多样性之间的权衡。</a:t>
+              <a:t>VRKGs </a:t>
+            </a:r>
+            <a:r>
+              <a:rPr lang="zh-CN" altLang="en-US" b="0" i="0" dirty="0">
+                <a:solidFill>
+                  <a:srgbClr val="000000"/>
+                </a:solidFill>
+                <a:effectLst/>
+                <a:latin typeface="微软雅黑" panose="020B0503020204020204" pitchFamily="34" charset="-122"/>
+                <a:ea typeface="微软雅黑" panose="020B0503020204020204" pitchFamily="34" charset="-122"/>
+              </a:rPr>
+              <a:t>来学习一种用于项目编码的虚拟关系知识，并设计了 </a:t>
+            </a:r>
+            <a:r>
+              <a:rPr lang="en-US" altLang="zh-CN" b="0" i="0" dirty="0">
+                <a:solidFill>
+                  <a:srgbClr val="000000"/>
+                </a:solidFill>
+                <a:effectLst/>
+                <a:latin typeface="微软雅黑" panose="020B0503020204020204" pitchFamily="34" charset="-122"/>
+                <a:ea typeface="微软雅黑" panose="020B0503020204020204" pitchFamily="34" charset="-122"/>
+              </a:rPr>
+              <a:t>LWS</a:t>
+            </a:r>
+            <a:r>
+              <a:rPr lang="zh-CN" altLang="en-US" b="0" i="0" dirty="0">
+                <a:solidFill>
+                  <a:srgbClr val="000000"/>
+                </a:solidFill>
+                <a:effectLst/>
+                <a:latin typeface="微软雅黑" panose="020B0503020204020204" pitchFamily="34" charset="-122"/>
+                <a:ea typeface="微软雅黑" panose="020B0503020204020204" pitchFamily="34" charset="-122"/>
+              </a:rPr>
+              <a:t>，一种新的图神经模型，用于图中的节点编码。</a:t>
             </a:r>
             <a:endParaRPr kumimoji="0" lang="zh-CN" altLang="zh-CN" b="0" i="0" u="none" strike="noStrike" cap="none" normalizeH="0" baseline="0" dirty="0">
               <a:ln>
@@ -26218,7 +26357,29 @@
                 <a:latin typeface="微软雅黑" panose="020B0503020204020204" pitchFamily="34" charset="-122"/>
                 <a:ea typeface="微软雅黑" panose="020B0503020204020204" pitchFamily="34" charset="-122"/>
               </a:rPr>
-              <a:t>将实体及其关系的知识编码为项目表示，并在推荐方面取得了出色且有前途的性能。然而，在现实世界的数据集中，知识图谱中的关系总是呈现长尾分布。</a:t>
+              <a:t>将实体及其关系的知识编码为项目表示，并在推荐方面取得了出色且有前途的性能。然而，在现实世界的数据集中，</a:t>
+            </a:r>
+            <a:r>
+              <a:rPr lang="zh-CN" altLang="en-US" sz="2400" b="0" i="0" dirty="0">
+                <a:solidFill>
+                  <a:srgbClr val="FF0000"/>
+                </a:solidFill>
+                <a:effectLst/>
+                <a:latin typeface="微软雅黑" panose="020B0503020204020204" pitchFamily="34" charset="-122"/>
+                <a:ea typeface="微软雅黑" panose="020B0503020204020204" pitchFamily="34" charset="-122"/>
+              </a:rPr>
+              <a:t>知识图谱中的关系总是呈现长尾分布</a:t>
+            </a:r>
+            <a:r>
+              <a:rPr lang="zh-CN" altLang="en-US" sz="2400" b="0" i="0" dirty="0">
+                <a:solidFill>
+                  <a:srgbClr val="000000"/>
+                </a:solidFill>
+                <a:effectLst/>
+                <a:latin typeface="微软雅黑" panose="020B0503020204020204" pitchFamily="34" charset="-122"/>
+                <a:ea typeface="微软雅黑" panose="020B0503020204020204" pitchFamily="34" charset="-122"/>
+              </a:rPr>
+              <a:t>。</a:t>
             </a:r>
             <a:endParaRPr kumimoji="0" lang="zh-CN" altLang="zh-CN" sz="2400" b="0" i="0" u="none" strike="noStrike" cap="none" normalizeH="0" baseline="0" dirty="0">
               <a:ln>
@@ -30193,7 +30354,28 @@
                 <a:latin typeface="微软雅黑" panose="020B0503020204020204" pitchFamily="34" charset="-122"/>
                 <a:ea typeface="微软雅黑" panose="020B0503020204020204" pitchFamily="34" charset="-122"/>
               </a:rPr>
-              <a:t>为了聚类相关关系，我们提出了一种无监督学习方法来探索每个原始关系的潜在因素，并将具有相似潜在因素的原始关系融合成一种虚拟关系</a:t>
+              <a:t>为了聚类相关关系，</a:t>
+            </a:r>
+            <a:r>
+              <a:rPr lang="zh-CN" altLang="en-US" dirty="0">
+                <a:solidFill>
+                  <a:srgbClr val="000000"/>
+                </a:solidFill>
+                <a:latin typeface="微软雅黑" panose="020B0503020204020204" pitchFamily="34" charset="-122"/>
+                <a:ea typeface="微软雅黑" panose="020B0503020204020204" pitchFamily="34" charset="-122"/>
+              </a:rPr>
+              <a:t>文章</a:t>
+            </a:r>
+            <a:r>
+              <a:rPr lang="zh-CN" altLang="en-US" b="0" i="0" dirty="0">
+                <a:solidFill>
+                  <a:srgbClr val="000000"/>
+                </a:solidFill>
+                <a:effectLst/>
+                <a:latin typeface="微软雅黑" panose="020B0503020204020204" pitchFamily="34" charset="-122"/>
+                <a:ea typeface="微软雅黑" panose="020B0503020204020204" pitchFamily="34" charset="-122"/>
+              </a:rPr>
+              <a:t>提出了一种无监督学习方法来探索每个原始关系的潜在因素，并将具有相似潜在因素的原始关系融合成一种虚拟关系</a:t>
             </a:r>
             <a:endParaRPr lang="en-US" altLang="zh-CN" b="0" i="0" dirty="0">
               <a:solidFill>

</xml_diff>